<commit_message>
Slides for GitHub Module
</commit_message>
<xml_diff>
--- a/Introduction to GitHub.pptx
+++ b/Introduction to GitHub.pptx
@@ -630,7 +630,7 @@
           <a:p>
             <a:fld id="{FCF42028-3C30-496E-9BC6-0F7AF5A6A954}" type="datetimeFigureOut">
               <a:rPr lang="en-US" smtClean="0"/>
-              <a:t>4/5/2023</a:t>
+              <a:t>5/31/2023</a:t>
             </a:fld>
             <a:endParaRPr lang="en-US"/>
           </a:p>
@@ -926,7 +926,7 @@
           <a:p>
             <a:fld id="{FCF42028-3C30-496E-9BC6-0F7AF5A6A954}" type="datetimeFigureOut">
               <a:rPr lang="en-US" smtClean="0"/>
-              <a:t>4/5/2023</a:t>
+              <a:t>5/31/2023</a:t>
             </a:fld>
             <a:endParaRPr lang="en-US"/>
           </a:p>
@@ -1174,7 +1174,7 @@
           <a:p>
             <a:fld id="{FCF42028-3C30-496E-9BC6-0F7AF5A6A954}" type="datetimeFigureOut">
               <a:rPr lang="en-US" smtClean="0"/>
-              <a:t>4/5/2023</a:t>
+              <a:t>5/31/2023</a:t>
             </a:fld>
             <a:endParaRPr lang="en-US"/>
           </a:p>
@@ -1714,7 +1714,7 @@
           <a:p>
             <a:fld id="{FCF42028-3C30-496E-9BC6-0F7AF5A6A954}" type="datetimeFigureOut">
               <a:rPr lang="en-US" smtClean="0"/>
-              <a:t>4/5/2023</a:t>
+              <a:t>5/31/2023</a:t>
             </a:fld>
             <a:endParaRPr lang="en-US"/>
           </a:p>
@@ -1962,7 +1962,7 @@
           <a:p>
             <a:fld id="{FCF42028-3C30-496E-9BC6-0F7AF5A6A954}" type="datetimeFigureOut">
               <a:rPr lang="en-US" smtClean="0"/>
-              <a:t>4/5/2023</a:t>
+              <a:t>5/31/2023</a:t>
             </a:fld>
             <a:endParaRPr lang="en-US"/>
           </a:p>
@@ -2494,7 +2494,7 @@
           <a:p>
             <a:fld id="{FCF42028-3C30-496E-9BC6-0F7AF5A6A954}" type="datetimeFigureOut">
               <a:rPr lang="en-US" smtClean="0"/>
-              <a:t>4/5/2023</a:t>
+              <a:t>5/31/2023</a:t>
             </a:fld>
             <a:endParaRPr lang="en-US"/>
           </a:p>
@@ -2791,7 +2791,7 @@
           <a:p>
             <a:fld id="{FCF42028-3C30-496E-9BC6-0F7AF5A6A954}" type="datetimeFigureOut">
               <a:rPr lang="en-US" smtClean="0"/>
-              <a:t>4/5/2023</a:t>
+              <a:t>5/31/2023</a:t>
             </a:fld>
             <a:endParaRPr lang="en-US"/>
           </a:p>
@@ -2965,7 +2965,7 @@
           <a:p>
             <a:fld id="{FCF42028-3C30-496E-9BC6-0F7AF5A6A954}" type="datetimeFigureOut">
               <a:rPr lang="en-US" smtClean="0"/>
-              <a:t>4/5/2023</a:t>
+              <a:t>5/31/2023</a:t>
             </a:fld>
             <a:endParaRPr lang="en-US"/>
           </a:p>
@@ -3145,7 +3145,7 @@
           <a:p>
             <a:fld id="{FCF42028-3C30-496E-9BC6-0F7AF5A6A954}" type="datetimeFigureOut">
               <a:rPr lang="en-US" smtClean="0"/>
-              <a:t>4/5/2023</a:t>
+              <a:t>5/31/2023</a:t>
             </a:fld>
             <a:endParaRPr lang="en-US"/>
           </a:p>
@@ -3315,7 +3315,7 @@
           <a:p>
             <a:fld id="{FCF42028-3C30-496E-9BC6-0F7AF5A6A954}" type="datetimeFigureOut">
               <a:rPr lang="en-US" smtClean="0"/>
-              <a:t>4/5/2023</a:t>
+              <a:t>5/31/2023</a:t>
             </a:fld>
             <a:endParaRPr lang="en-US"/>
           </a:p>
@@ -3566,7 +3566,7 @@
           <a:p>
             <a:fld id="{FCF42028-3C30-496E-9BC6-0F7AF5A6A954}" type="datetimeFigureOut">
               <a:rPr lang="en-US" smtClean="0"/>
-              <a:t>4/5/2023</a:t>
+              <a:t>5/31/2023</a:t>
             </a:fld>
             <a:endParaRPr lang="en-US"/>
           </a:p>
@@ -3863,7 +3863,7 @@
           <a:p>
             <a:fld id="{FCF42028-3C30-496E-9BC6-0F7AF5A6A954}" type="datetimeFigureOut">
               <a:rPr lang="en-US" smtClean="0"/>
-              <a:t>4/5/2023</a:t>
+              <a:t>5/31/2023</a:t>
             </a:fld>
             <a:endParaRPr lang="en-US"/>
           </a:p>
@@ -4305,7 +4305,7 @@
           <a:p>
             <a:fld id="{FCF42028-3C30-496E-9BC6-0F7AF5A6A954}" type="datetimeFigureOut">
               <a:rPr lang="en-US" smtClean="0"/>
-              <a:t>4/5/2023</a:t>
+              <a:t>5/31/2023</a:t>
             </a:fld>
             <a:endParaRPr lang="en-US"/>
           </a:p>
@@ -4423,7 +4423,7 @@
           <a:p>
             <a:fld id="{FCF42028-3C30-496E-9BC6-0F7AF5A6A954}" type="datetimeFigureOut">
               <a:rPr lang="en-US" smtClean="0"/>
-              <a:t>4/5/2023</a:t>
+              <a:t>5/31/2023</a:t>
             </a:fld>
             <a:endParaRPr lang="en-US"/>
           </a:p>
@@ -4518,7 +4518,7 @@
           <a:p>
             <a:fld id="{FCF42028-3C30-496E-9BC6-0F7AF5A6A954}" type="datetimeFigureOut">
               <a:rPr lang="en-US" smtClean="0"/>
-              <a:t>4/5/2023</a:t>
+              <a:t>5/31/2023</a:t>
             </a:fld>
             <a:endParaRPr lang="en-US"/>
           </a:p>
@@ -4801,7 +4801,7 @@
           <a:p>
             <a:fld id="{FCF42028-3C30-496E-9BC6-0F7AF5A6A954}" type="datetimeFigureOut">
               <a:rPr lang="en-US" smtClean="0"/>
-              <a:t>4/5/2023</a:t>
+              <a:t>5/31/2023</a:t>
             </a:fld>
             <a:endParaRPr lang="en-US"/>
           </a:p>
@@ -5092,7 +5092,7 @@
           <a:p>
             <a:fld id="{FCF42028-3C30-496E-9BC6-0F7AF5A6A954}" type="datetimeFigureOut">
               <a:rPr lang="en-US" smtClean="0"/>
-              <a:t>4/5/2023</a:t>
+              <a:t>5/31/2023</a:t>
             </a:fld>
             <a:endParaRPr lang="en-US"/>
           </a:p>
@@ -5622,7 +5622,7 @@
           <a:p>
             <a:fld id="{FCF42028-3C30-496E-9BC6-0F7AF5A6A954}" type="datetimeFigureOut">
               <a:rPr lang="en-US" smtClean="0"/>
-              <a:t>4/5/2023</a:t>
+              <a:t>5/31/2023</a:t>
             </a:fld>
             <a:endParaRPr lang="en-US"/>
           </a:p>
@@ -7215,18 +7215,18 @@
           <a:p>
             <a:r>
               <a:rPr lang="en-US" dirty="0"/>
-              <a:t>Your files will now be visible in their repository and will display the message you typed when you </a:t>
-            </a:r>
-            <a:r>
-              <a:rPr lang="en-US" dirty="0" err="1"/>
-              <a:t>commited</a:t>
+              <a:t>Your files will now be visible in their repository and will display the message you typed when </a:t>
+            </a:r>
+            <a:r>
+              <a:rPr lang="en-US"/>
+              <a:t>you committed</a:t>
             </a:r>
             <a:endParaRPr lang="en-US" dirty="0"/>
           </a:p>
           <a:p>
             <a:r>
               <a:rPr lang="en-US" dirty="0"/>
-              <a:t>Your GitHub Repos will display your projects to the world and are a great way to show off your programming experience to the world (and especially employers) </a:t>
+              <a:t>Your GitHub Repos will display your projects to the world and are a great way to show off your programming experience to the world (and especially employers)  </a:t>
             </a:r>
           </a:p>
         </p:txBody>

</xml_diff>